<commit_message>
Ready for full team use
</commit_message>
<xml_diff>
--- a/Template2.pptx
+++ b/Template2.pptx
@@ -252,7 +252,7 @@
           <a:p>
             <a:fld id="{CEA20838-168E-4F9F-A3C7-3F1CB847789B}" type="datetimeFigureOut">
               <a:rPr lang="en-US" smtClean="0"/>
-              <a:t>11/10/2023</a:t>
+              <a:t>1/11/2024</a:t>
             </a:fld>
             <a:endParaRPr lang="en-US"/>
           </a:p>
@@ -422,7 +422,7 @@
           <a:p>
             <a:fld id="{CEA20838-168E-4F9F-A3C7-3F1CB847789B}" type="datetimeFigureOut">
               <a:rPr lang="en-US" smtClean="0"/>
-              <a:t>11/10/2023</a:t>
+              <a:t>1/11/2024</a:t>
             </a:fld>
             <a:endParaRPr lang="en-US"/>
           </a:p>
@@ -602,7 +602,7 @@
           <a:p>
             <a:fld id="{CEA20838-168E-4F9F-A3C7-3F1CB847789B}" type="datetimeFigureOut">
               <a:rPr lang="en-US" smtClean="0"/>
-              <a:t>11/10/2023</a:t>
+              <a:t>1/11/2024</a:t>
             </a:fld>
             <a:endParaRPr lang="en-US"/>
           </a:p>
@@ -772,7 +772,7 @@
           <a:p>
             <a:fld id="{CEA20838-168E-4F9F-A3C7-3F1CB847789B}" type="datetimeFigureOut">
               <a:rPr lang="en-US" smtClean="0"/>
-              <a:t>11/10/2023</a:t>
+              <a:t>1/11/2024</a:t>
             </a:fld>
             <a:endParaRPr lang="en-US"/>
           </a:p>
@@ -1016,7 +1016,7 @@
           <a:p>
             <a:fld id="{CEA20838-168E-4F9F-A3C7-3F1CB847789B}" type="datetimeFigureOut">
               <a:rPr lang="en-US" smtClean="0"/>
-              <a:t>11/10/2023</a:t>
+              <a:t>1/11/2024</a:t>
             </a:fld>
             <a:endParaRPr lang="en-US"/>
           </a:p>
@@ -1248,7 +1248,7 @@
           <a:p>
             <a:fld id="{CEA20838-168E-4F9F-A3C7-3F1CB847789B}" type="datetimeFigureOut">
               <a:rPr lang="en-US" smtClean="0"/>
-              <a:t>11/10/2023</a:t>
+              <a:t>1/11/2024</a:t>
             </a:fld>
             <a:endParaRPr lang="en-US"/>
           </a:p>
@@ -1615,7 +1615,7 @@
           <a:p>
             <a:fld id="{CEA20838-168E-4F9F-A3C7-3F1CB847789B}" type="datetimeFigureOut">
               <a:rPr lang="en-US" smtClean="0"/>
-              <a:t>11/10/2023</a:t>
+              <a:t>1/11/2024</a:t>
             </a:fld>
             <a:endParaRPr lang="en-US"/>
           </a:p>
@@ -1733,7 +1733,7 @@
           <a:p>
             <a:fld id="{CEA20838-168E-4F9F-A3C7-3F1CB847789B}" type="datetimeFigureOut">
               <a:rPr lang="en-US" smtClean="0"/>
-              <a:t>11/10/2023</a:t>
+              <a:t>1/11/2024</a:t>
             </a:fld>
             <a:endParaRPr lang="en-US"/>
           </a:p>
@@ -1828,7 +1828,7 @@
           <a:p>
             <a:fld id="{CEA20838-168E-4F9F-A3C7-3F1CB847789B}" type="datetimeFigureOut">
               <a:rPr lang="en-US" smtClean="0"/>
-              <a:t>11/10/2023</a:t>
+              <a:t>1/11/2024</a:t>
             </a:fld>
             <a:endParaRPr lang="en-US"/>
           </a:p>
@@ -2105,7 +2105,7 @@
           <a:p>
             <a:fld id="{CEA20838-168E-4F9F-A3C7-3F1CB847789B}" type="datetimeFigureOut">
               <a:rPr lang="en-US" smtClean="0"/>
-              <a:t>11/10/2023</a:t>
+              <a:t>1/11/2024</a:t>
             </a:fld>
             <a:endParaRPr lang="en-US"/>
           </a:p>
@@ -2362,7 +2362,7 @@
           <a:p>
             <a:fld id="{CEA20838-168E-4F9F-A3C7-3F1CB847789B}" type="datetimeFigureOut">
               <a:rPr lang="en-US" smtClean="0"/>
-              <a:t>11/10/2023</a:t>
+              <a:t>1/11/2024</a:t>
             </a:fld>
             <a:endParaRPr lang="en-US"/>
           </a:p>
@@ -2575,7 +2575,7 @@
           <a:p>
             <a:fld id="{CEA20838-168E-4F9F-A3C7-3F1CB847789B}" type="datetimeFigureOut">
               <a:rPr lang="en-US" smtClean="0"/>
-              <a:t>11/10/2023</a:t>
+              <a:t>1/11/2024</a:t>
             </a:fld>
             <a:endParaRPr lang="en-US"/>
           </a:p>
@@ -3146,7 +3146,7 @@
               <a:rPr lang="en-US" b="1" dirty="0">
                 <a:latin typeface="Beaver Bold" pitchFamily="50" charset="0"/>
               </a:rPr>
-              <a:t>November 10</a:t>
+              <a:t>Fall 2023</a:t>
             </a:r>
           </a:p>
         </p:txBody>

</xml_diff>

<commit_message>
reduced font size on vaa
</commit_message>
<xml_diff>
--- a/Template2.pptx
+++ b/Template2.pptx
@@ -252,7 +252,7 @@
           <a:p>
             <a:fld id="{CEA20838-168E-4F9F-A3C7-3F1CB847789B}" type="datetimeFigureOut">
               <a:rPr lang="en-US" smtClean="0"/>
-              <a:t>1/11/2024</a:t>
+              <a:t>1/26/2024</a:t>
             </a:fld>
             <a:endParaRPr lang="en-US"/>
           </a:p>
@@ -422,7 +422,7 @@
           <a:p>
             <a:fld id="{CEA20838-168E-4F9F-A3C7-3F1CB847789B}" type="datetimeFigureOut">
               <a:rPr lang="en-US" smtClean="0"/>
-              <a:t>1/11/2024</a:t>
+              <a:t>1/26/2024</a:t>
             </a:fld>
             <a:endParaRPr lang="en-US"/>
           </a:p>
@@ -602,7 +602,7 @@
           <a:p>
             <a:fld id="{CEA20838-168E-4F9F-A3C7-3F1CB847789B}" type="datetimeFigureOut">
               <a:rPr lang="en-US" smtClean="0"/>
-              <a:t>1/11/2024</a:t>
+              <a:t>1/26/2024</a:t>
             </a:fld>
             <a:endParaRPr lang="en-US"/>
           </a:p>
@@ -772,7 +772,7 @@
           <a:p>
             <a:fld id="{CEA20838-168E-4F9F-A3C7-3F1CB847789B}" type="datetimeFigureOut">
               <a:rPr lang="en-US" smtClean="0"/>
-              <a:t>1/11/2024</a:t>
+              <a:t>1/26/2024</a:t>
             </a:fld>
             <a:endParaRPr lang="en-US"/>
           </a:p>
@@ -1016,7 +1016,7 @@
           <a:p>
             <a:fld id="{CEA20838-168E-4F9F-A3C7-3F1CB847789B}" type="datetimeFigureOut">
               <a:rPr lang="en-US" smtClean="0"/>
-              <a:t>1/11/2024</a:t>
+              <a:t>1/26/2024</a:t>
             </a:fld>
             <a:endParaRPr lang="en-US"/>
           </a:p>
@@ -1248,7 +1248,7 @@
           <a:p>
             <a:fld id="{CEA20838-168E-4F9F-A3C7-3F1CB847789B}" type="datetimeFigureOut">
               <a:rPr lang="en-US" smtClean="0"/>
-              <a:t>1/11/2024</a:t>
+              <a:t>1/26/2024</a:t>
             </a:fld>
             <a:endParaRPr lang="en-US"/>
           </a:p>
@@ -1615,7 +1615,7 @@
           <a:p>
             <a:fld id="{CEA20838-168E-4F9F-A3C7-3F1CB847789B}" type="datetimeFigureOut">
               <a:rPr lang="en-US" smtClean="0"/>
-              <a:t>1/11/2024</a:t>
+              <a:t>1/26/2024</a:t>
             </a:fld>
             <a:endParaRPr lang="en-US"/>
           </a:p>
@@ -1733,7 +1733,7 @@
           <a:p>
             <a:fld id="{CEA20838-168E-4F9F-A3C7-3F1CB847789B}" type="datetimeFigureOut">
               <a:rPr lang="en-US" smtClean="0"/>
-              <a:t>1/11/2024</a:t>
+              <a:t>1/26/2024</a:t>
             </a:fld>
             <a:endParaRPr lang="en-US"/>
           </a:p>
@@ -1828,7 +1828,7 @@
           <a:p>
             <a:fld id="{CEA20838-168E-4F9F-A3C7-3F1CB847789B}" type="datetimeFigureOut">
               <a:rPr lang="en-US" smtClean="0"/>
-              <a:t>1/11/2024</a:t>
+              <a:t>1/26/2024</a:t>
             </a:fld>
             <a:endParaRPr lang="en-US"/>
           </a:p>
@@ -2105,7 +2105,7 @@
           <a:p>
             <a:fld id="{CEA20838-168E-4F9F-A3C7-3F1CB847789B}" type="datetimeFigureOut">
               <a:rPr lang="en-US" smtClean="0"/>
-              <a:t>1/11/2024</a:t>
+              <a:t>1/26/2024</a:t>
             </a:fld>
             <a:endParaRPr lang="en-US"/>
           </a:p>
@@ -2362,7 +2362,7 @@
           <a:p>
             <a:fld id="{CEA20838-168E-4F9F-A3C7-3F1CB847789B}" type="datetimeFigureOut">
               <a:rPr lang="en-US" smtClean="0"/>
-              <a:t>1/11/2024</a:t>
+              <a:t>1/26/2024</a:t>
             </a:fld>
             <a:endParaRPr lang="en-US"/>
           </a:p>
@@ -2575,7 +2575,7 @@
           <a:p>
             <a:fld id="{CEA20838-168E-4F9F-A3C7-3F1CB847789B}" type="datetimeFigureOut">
               <a:rPr lang="en-US" smtClean="0"/>
-              <a:t>1/11/2024</a:t>
+              <a:t>1/26/2024</a:t>
             </a:fld>
             <a:endParaRPr lang="en-US"/>
           </a:p>
@@ -3146,7 +3146,7 @@
               <a:rPr lang="en-US" b="1" dirty="0">
                 <a:latin typeface="Beaver Bold" pitchFamily="50" charset="0"/>
               </a:rPr>
-              <a:t>Fall 2023</a:t>
+              <a:t>2023 Season</a:t>
             </a:r>
           </a:p>
         </p:txBody>

</xml_diff>